<commit_message>
Added section arrows to poster
</commit_message>
<xml_diff>
--- a/docs/Poster/Poster.pptx
+++ b/docs/Poster/Poster.pptx
@@ -17320,7 +17320,7 @@
         <p:spPr>
           <a:xfrm>
             <a:off x="864360" y="15572035"/>
-            <a:ext cx="9968400" cy="4068452"/>
+            <a:ext cx="9540293" cy="4068452"/>
           </a:xfrm>
           <a:prstGeom prst="rect">
             <a:avLst/>
@@ -20409,6 +20409,156 @@
           <a:effectLst/>
         </p:spPr>
       </p:cxnSp>
+      <p:sp>
+        <p:nvSpPr>
+          <p:cNvPr id="12" name="Down Arrow 11"/>
+          <p:cNvSpPr/>
+          <p:nvPr/>
+        </p:nvSpPr>
+        <p:spPr bwMode="auto">
+          <a:xfrm>
+            <a:off x="5037370" y="19836331"/>
+            <a:ext cx="1962000" cy="842400"/>
+          </a:xfrm>
+          <a:prstGeom prst="downArrow">
+            <a:avLst/>
+          </a:prstGeom>
+          <a:ln>
+            <a:headEnd type="none" w="med" len="med"/>
+            <a:tailEnd type="none" w="med" len="med"/>
+          </a:ln>
+        </p:spPr>
+        <p:style>
+          <a:lnRef idx="2">
+            <a:schemeClr val="accent4">
+              <a:shade val="50000"/>
+            </a:schemeClr>
+          </a:lnRef>
+          <a:fillRef idx="1">
+            <a:schemeClr val="accent4"/>
+          </a:fillRef>
+          <a:effectRef idx="0">
+            <a:schemeClr val="accent4"/>
+          </a:effectRef>
+          <a:fontRef idx="minor">
+            <a:schemeClr val="lt1"/>
+          </a:fontRef>
+        </p:style>
+        <p:txBody>
+          <a:bodyPr vert="horz" wrap="square" lIns="91440" tIns="45720" rIns="91440" bIns="45720" numCol="1" rtlCol="0" anchor="ctr" anchorCtr="0" compatLnSpc="1">
+            <a:prstTxWarp prst="textNoShape">
+              <a:avLst/>
+            </a:prstTxWarp>
+            <a:spAutoFit/>
+          </a:bodyPr>
+          <a:lstStyle/>
+          <a:p>
+            <a:pPr marL="0" marR="0" indent="0" algn="ctr" defTabSz="914400" rtl="0" eaLnBrk="1" fontAlgn="base" latinLnBrk="0" hangingPunct="1">
+              <a:lnSpc>
+                <a:spcPct val="100000"/>
+              </a:lnSpc>
+              <a:spcBef>
+                <a:spcPct val="50000"/>
+              </a:spcBef>
+              <a:spcAft>
+                <a:spcPct val="0"/>
+              </a:spcAft>
+              <a:buClrTx/>
+              <a:buSzTx/>
+              <a:buFontTx/>
+              <a:buNone/>
+              <a:tabLst/>
+            </a:pPr>
+            <a:endParaRPr kumimoji="0" lang="en-AU" sz="1400" b="0" i="0" u="none" strike="noStrike" cap="none" normalizeH="0" baseline="0">
+              <a:ln>
+                <a:noFill/>
+              </a:ln>
+              <a:solidFill>
+                <a:schemeClr val="tx1"/>
+              </a:solidFill>
+              <a:effectLst/>
+              <a:latin typeface="Arial" charset="0"/>
+              <a:ea typeface="Arial" charset="0"/>
+              <a:cs typeface="Arial" charset="0"/>
+            </a:endParaRPr>
+          </a:p>
+        </p:txBody>
+      </p:sp>
+      <p:sp>
+        <p:nvSpPr>
+          <p:cNvPr id="14" name="Right Arrow 13"/>
+          <p:cNvSpPr/>
+          <p:nvPr/>
+        </p:nvSpPr>
+        <p:spPr bwMode="auto">
+          <a:xfrm>
+            <a:off x="10498007" y="16616151"/>
+            <a:ext cx="842105" cy="1962855"/>
+          </a:xfrm>
+          <a:prstGeom prst="rightArrow">
+            <a:avLst/>
+          </a:prstGeom>
+          <a:ln>
+            <a:headEnd type="none" w="med" len="med"/>
+            <a:tailEnd type="none" w="med" len="med"/>
+          </a:ln>
+        </p:spPr>
+        <p:style>
+          <a:lnRef idx="2">
+            <a:schemeClr val="accent4">
+              <a:shade val="50000"/>
+            </a:schemeClr>
+          </a:lnRef>
+          <a:fillRef idx="1">
+            <a:schemeClr val="accent4"/>
+          </a:fillRef>
+          <a:effectRef idx="0">
+            <a:schemeClr val="accent4"/>
+          </a:effectRef>
+          <a:fontRef idx="minor">
+            <a:schemeClr val="lt1"/>
+          </a:fontRef>
+        </p:style>
+        <p:txBody>
+          <a:bodyPr vert="horz" wrap="square" lIns="91440" tIns="45720" rIns="91440" bIns="45720" numCol="1" rtlCol="0" anchor="ctr" anchorCtr="0" compatLnSpc="1">
+            <a:prstTxWarp prst="textNoShape">
+              <a:avLst/>
+            </a:prstTxWarp>
+            <a:spAutoFit/>
+          </a:bodyPr>
+          <a:lstStyle/>
+          <a:p>
+            <a:pPr marL="0" marR="0" indent="0" algn="ctr" defTabSz="914400" rtl="0" eaLnBrk="1" fontAlgn="base" latinLnBrk="0" hangingPunct="1">
+              <a:lnSpc>
+                <a:spcPct val="100000"/>
+              </a:lnSpc>
+              <a:spcBef>
+                <a:spcPct val="50000"/>
+              </a:spcBef>
+              <a:spcAft>
+                <a:spcPct val="0"/>
+              </a:spcAft>
+              <a:buClrTx/>
+              <a:buSzTx/>
+              <a:buFontTx/>
+              <a:buNone/>
+              <a:tabLst/>
+            </a:pPr>
+            <a:endParaRPr kumimoji="0" lang="en-AU" sz="1400" b="0" i="0" u="none" strike="noStrike" cap="none" normalizeH="0" baseline="0">
+              <a:ln>
+                <a:noFill/>
+              </a:ln>
+              <a:solidFill>
+                <a:schemeClr val="tx1"/>
+              </a:solidFill>
+              <a:effectLst/>
+              <a:latin typeface="Arial" charset="0"/>
+              <a:ea typeface="Arial" charset="0"/>
+              <a:cs typeface="Arial" charset="0"/>
+            </a:endParaRPr>
+          </a:p>
+        </p:txBody>
+      </p:sp>
     </p:spTree>
   </p:cSld>
   <p:clrMapOvr>

</xml_diff>